<commit_message>
added Git Document Control Slide
</commit_message>
<xml_diff>
--- a/Intro to Git and GitHub.pptx
+++ b/Intro to Git and GitHub.pptx
@@ -5580,7 +5580,7 @@
         <p:spPr>
           <a:xfrm>
             <a:off x="165592" y="713500"/>
-            <a:ext cx="11813048" cy="2585323"/>
+            <a:ext cx="11813048" cy="3108543"/>
           </a:xfrm>
           <a:prstGeom prst="rect">
             <a:avLst/>
@@ -5594,24 +5594,12 @@
           <a:lstStyle/>
           <a:p>
             <a:r>
-              <a:rPr lang="en-US" b="1" dirty="0"/>
-              <a:t>Used to copy a repository to your account.</a:t>
-            </a:r>
-          </a:p>
-          <a:p>
-            <a:r>
-              <a:rPr lang="en-US" b="1" dirty="0"/>
-              <a:t>    </a:t>
-            </a:r>
-          </a:p>
-          <a:p>
-            <a:r>
-              <a:rPr lang="en-US" b="1" dirty="0"/>
+              <a:rPr lang="en-US" b="1" i="1" dirty="0"/>
               <a:t>How fork is different from clone?</a:t>
             </a:r>
           </a:p>
           <a:p>
-            <a:endParaRPr lang="en-US" b="1" dirty="0"/>
+            <a:endParaRPr lang="en-US" dirty="0"/>
           </a:p>
           <a:p>
             <a:pPr marL="285750" indent="-285750">
@@ -5619,24 +5607,16 @@
               <a:buChar char="•"/>
             </a:pPr>
             <a:r>
-              <a:rPr lang="en-US" dirty="0"/>
-              <a:t>Fork is used on Git platforms. (</a:t>
-            </a:r>
-            <a:r>
-              <a:rPr lang="en-US" dirty="0" err="1"/>
-              <a:t>GitHub,Bitbucket</a:t>
-            </a:r>
-            <a:r>
-              <a:rPr lang="en-US" dirty="0"/>
-              <a:t> </a:t>
-            </a:r>
-            <a:r>
-              <a:rPr lang="en-US" dirty="0" err="1"/>
-              <a:t>etc</a:t>
-            </a:r>
-            <a:r>
-              <a:rPr lang="en-US" dirty="0"/>
-              <a:t>)  for cloning a (third party) public/open git repository</a:t>
+              <a:rPr lang="en-US" sz="1600" dirty="0"/>
+              <a:t>A </a:t>
+            </a:r>
+            <a:r>
+              <a:rPr lang="en-US" sz="1600" b="1" dirty="0"/>
+              <a:t>fork</a:t>
+            </a:r>
+            <a:r>
+              <a:rPr lang="en-US" sz="1600" dirty="0"/>
+              <a:t> is used on Remote Git platforms like GitHub or Bitbucket to create a copy of a third-party public or open-source repository under your own account. This copy is independent, so any changes you make in your fork do not affect the original repository.</a:t>
             </a:r>
           </a:p>
           <a:p>
@@ -5644,10 +5624,7 @@
               <a:buFont typeface="Arial" panose="020B0604020202020204" pitchFamily="34" charset="0"/>
               <a:buChar char="•"/>
             </a:pPr>
-            <a:r>
-              <a:rPr lang="en-US" dirty="0"/>
-              <a:t>Clone is used to create a local version of own repositories.</a:t>
-            </a:r>
+            <a:endParaRPr lang="en-US" sz="1600" dirty="0"/>
           </a:p>
           <a:p>
             <a:pPr marL="285750" indent="-285750">
@@ -5655,8 +5632,16 @@
               <a:buChar char="•"/>
             </a:pPr>
             <a:r>
-              <a:rPr lang="en-US" dirty="0"/>
-              <a:t>Fork creates a duplicate repository under your account and changes in this doesn’t affect the master.</a:t>
+              <a:rPr lang="en-US" sz="1600" dirty="0"/>
+              <a:t>A </a:t>
+            </a:r>
+            <a:r>
+              <a:rPr lang="en-US" sz="1600" b="1" dirty="0"/>
+              <a:t>clone</a:t>
+            </a:r>
+            <a:r>
+              <a:rPr lang="en-US" sz="1600" dirty="0"/>
+              <a:t> is used to create a local copy of any repository on your machine, whether it's your own repository, a forked repository, or one you have direct access to. Changes made to a cloned repository can be pushed back to the original repository, and these changes will be reflected in the original repository if you have the necessary permissions.</a:t>
             </a:r>
           </a:p>
           <a:p>
@@ -5664,18 +5649,7 @@
               <a:buFont typeface="Arial" panose="020B0604020202020204" pitchFamily="34" charset="0"/>
               <a:buChar char="•"/>
             </a:pPr>
-            <a:r>
-              <a:rPr lang="en-US" dirty="0"/>
-              <a:t>Changes in repository created using clone </a:t>
-            </a:r>
-            <a:r>
-              <a:rPr lang="en-US" dirty="0" err="1"/>
-              <a:t>fn</a:t>
-            </a:r>
-            <a:r>
-              <a:rPr lang="en-US" dirty="0"/>
-              <a:t> , reflects in the master.</a:t>
-            </a:r>
+            <a:endParaRPr lang="en-US" sz="1600" dirty="0"/>
           </a:p>
           <a:p>
             <a:pPr marL="285750" indent="-285750">
@@ -5683,8 +5657,8 @@
               <a:buChar char="•"/>
             </a:pPr>
             <a:r>
-              <a:rPr lang="en-US" dirty="0"/>
-              <a:t>Once you ‘forked’ a repository , you need to clone it to your local system to work on it.</a:t>
+              <a:rPr lang="en-US" sz="1600" dirty="0"/>
+              <a:t>When you fork a repository, you’ll usually need to clone your fork to your local system to begin working on it. This allows you to make changes locally before pushing them to your fork and eventually proposing them to the original project.</a:t>
             </a:r>
           </a:p>
         </p:txBody>
@@ -5721,10 +5695,10 @@
       </p:pic>
       <p:sp>
         <p:nvSpPr>
-          <p:cNvPr id="9" name="TextBox 8">
-            <a:extLst>
-              <a:ext uri="{FF2B5EF4-FFF2-40B4-BE49-F238E27FC236}">
-                <a16:creationId xmlns:a16="http://schemas.microsoft.com/office/drawing/2014/main" id="{02DCAA05-1FF3-0DDB-D004-29F57E377287}"/>
+          <p:cNvPr id="2" name="TextBox 1">
+            <a:extLst>
+              <a:ext uri="{FF2B5EF4-FFF2-40B4-BE49-F238E27FC236}">
+                <a16:creationId xmlns:a16="http://schemas.microsoft.com/office/drawing/2014/main" id="{1316ED84-790E-8ACF-7E4F-737BDEF1C0ED}"/>
               </a:ext>
             </a:extLst>
           </p:cNvPr>
@@ -5733,8 +5707,8 @@
         </p:nvSpPr>
         <p:spPr>
           <a:xfrm>
-            <a:off x="165592" y="3429000"/>
-            <a:ext cx="11813048" cy="2308324"/>
+            <a:off x="203110" y="4001919"/>
+            <a:ext cx="11813048" cy="1815882"/>
           </a:xfrm>
           <a:prstGeom prst="rect">
             <a:avLst/>
@@ -5748,12 +5722,12 @@
           <a:lstStyle/>
           <a:p>
             <a:r>
-              <a:rPr lang="en-US" b="1" dirty="0"/>
+              <a:rPr lang="en-US" sz="1600" b="1" dirty="0"/>
               <a:t>Workflow Example:</a:t>
             </a:r>
           </a:p>
           <a:p>
-            <a:endParaRPr lang="en-US" b="1" dirty="0"/>
+            <a:endParaRPr lang="en-US" sz="1600" b="1" dirty="0"/>
           </a:p>
           <a:p>
             <a:pPr marL="285750" indent="-285750">
@@ -5761,16 +5735,16 @@
               <a:buChar char="•"/>
             </a:pPr>
             <a:r>
-              <a:rPr lang="en-US" b="1" dirty="0"/>
+              <a:rPr lang="en-US" sz="1600" b="1" dirty="0"/>
               <a:t>Forking: </a:t>
             </a:r>
             <a:r>
-              <a:rPr lang="en-US" dirty="0"/>
+              <a:rPr lang="en-US" sz="1600" dirty="0"/>
               <a:t>You find an interesting project on GitHub. You fork it to your account, clone your fork to your local machine, make changes, push them to your fork, and then create a pull request to suggest your changes to the original project.</a:t>
             </a:r>
           </a:p>
           <a:p>
-            <a:endParaRPr lang="en-US" dirty="0"/>
+            <a:endParaRPr lang="en-US" sz="1600" dirty="0"/>
           </a:p>
           <a:p>
             <a:pPr marL="285750" indent="-285750">
@@ -5778,11 +5752,11 @@
               <a:buChar char="•"/>
             </a:pPr>
             <a:r>
-              <a:rPr lang="en-US" b="1" dirty="0"/>
+              <a:rPr lang="en-US" sz="1600" b="1" dirty="0"/>
               <a:t>Cloning: </a:t>
             </a:r>
             <a:r>
-              <a:rPr lang="en-US" dirty="0"/>
+              <a:rPr lang="en-US" sz="1600" dirty="0"/>
               <a:t>You have access to a repository (either your own or one you’re a contributor to). You clone it to your local machine, work on it, and push changes directly back to the same repository.</a:t>
             </a:r>
           </a:p>
@@ -5853,7 +5827,7 @@
           <a:p>
             <a:r>
               <a:rPr lang="en-US" sz="2800" b="1" dirty="0"/>
-              <a:t>Git – Document (Manuscript Management)</a:t>
+              <a:t>Git – Document Control (Manuscript Management)</a:t>
             </a:r>
             <a:r>
               <a:rPr lang="en-US" dirty="0"/>
@@ -5970,8 +5944,8 @@
         </p:nvSpPr>
         <p:spPr>
           <a:xfrm>
-            <a:off x="236997" y="893604"/>
-            <a:ext cx="11813048" cy="2308324"/>
+            <a:off x="236997" y="1239044"/>
+            <a:ext cx="11813048" cy="2862322"/>
           </a:xfrm>
           <a:prstGeom prst="rect">
             <a:avLst/>
@@ -5985,12 +5959,121 @@
           <a:lstStyle/>
           <a:p>
             <a:r>
-              <a:rPr lang="en-US" b="1" dirty="0"/>
-              <a:t>Workflow Example:</a:t>
-            </a:r>
-          </a:p>
-          <a:p>
-            <a:endParaRPr lang="en-US" b="1" dirty="0"/>
+              <a:rPr lang="en-US" dirty="0"/>
+              <a:t>Git can be used effectively for writing and managing a manuscript with multiple contributors.</a:t>
+            </a:r>
+          </a:p>
+          <a:p>
+            <a:endParaRPr lang="en-US" dirty="0"/>
+          </a:p>
+          <a:p>
+            <a:pPr marL="285750" indent="-285750">
+              <a:buFontTx/>
+              <a:buChar char="-"/>
+            </a:pPr>
+            <a:r>
+              <a:rPr lang="en-US" dirty="0"/>
+              <a:t>Version Control: track changes and commit history.</a:t>
+            </a:r>
+          </a:p>
+          <a:p>
+            <a:pPr marL="285750" indent="-285750">
+              <a:buFontTx/>
+              <a:buChar char="-"/>
+            </a:pPr>
+            <a:r>
+              <a:rPr lang="en-US" dirty="0"/>
+              <a:t>Branches : Multiple authors can contribute and easy to identify and resolve conflicts.</a:t>
+            </a:r>
+          </a:p>
+          <a:p>
+            <a:pPr marL="285750" indent="-285750">
+              <a:buFontTx/>
+              <a:buChar char="-"/>
+            </a:pPr>
+            <a:r>
+              <a:rPr lang="en-US" dirty="0"/>
+              <a:t>Remote repository :online and easily accessible and data safety.</a:t>
+            </a:r>
+          </a:p>
+          <a:p>
+            <a:pPr marL="285750" indent="-285750">
+              <a:buFontTx/>
+              <a:buChar char="-"/>
+            </a:pPr>
+            <a:r>
+              <a:rPr lang="en-US" dirty="0"/>
+              <a:t>Pull request: enables proper QC by Maintainer. </a:t>
+            </a:r>
+          </a:p>
+          <a:p>
+            <a:pPr marL="285750" indent="-285750">
+              <a:buFontTx/>
+              <a:buChar char="-"/>
+            </a:pPr>
+            <a:r>
+              <a:rPr lang="en-US" dirty="0"/>
+              <a:t>Supports Latex and Markdown.</a:t>
+            </a:r>
+          </a:p>
+          <a:p>
+            <a:pPr marL="285750" indent="-285750">
+              <a:buFontTx/>
+              <a:buChar char="-"/>
+            </a:pPr>
+            <a:r>
+              <a:rPr lang="en-US" dirty="0"/>
+              <a:t>Access control: Different levels of access can be provided.</a:t>
+            </a:r>
+          </a:p>
+          <a:p>
+            <a:pPr marL="285750" indent="-285750">
+              <a:buFontTx/>
+              <a:buChar char="-"/>
+            </a:pPr>
+            <a:endParaRPr lang="en-US" dirty="0"/>
+          </a:p>
+          <a:p>
+            <a:pPr marL="285750" indent="-285750">
+              <a:buFontTx/>
+              <a:buChar char="-"/>
+            </a:pPr>
+            <a:endParaRPr lang="en-US" dirty="0"/>
+          </a:p>
+        </p:txBody>
+      </p:sp>
+      <p:sp>
+        <p:nvSpPr>
+          <p:cNvPr id="5" name="TextBox 4">
+            <a:extLst>
+              <a:ext uri="{FF2B5EF4-FFF2-40B4-BE49-F238E27FC236}">
+                <a16:creationId xmlns:a16="http://schemas.microsoft.com/office/drawing/2014/main" id="{FA21F378-EFA1-A627-820C-993BC742C639}"/>
+              </a:ext>
+            </a:extLst>
+          </p:cNvPr>
+          <p:cNvSpPr txBox="1"/>
+          <p:nvPr/>
+        </p:nvSpPr>
+        <p:spPr>
+          <a:xfrm>
+            <a:off x="236996" y="4101366"/>
+            <a:ext cx="8358363" cy="1200329"/>
+          </a:xfrm>
+          <a:prstGeom prst="rect">
+            <a:avLst/>
+          </a:prstGeom>
+          <a:noFill/>
+        </p:spPr>
+        <p:txBody>
+          <a:bodyPr wrap="square">
+            <a:spAutoFit/>
+          </a:bodyPr>
+          <a:lstStyle/>
+          <a:p>
+            <a:r>
+              <a:rPr lang="en-US" dirty="0"/>
+              <a:t>References:</a:t>
+            </a:r>
           </a:p>
           <a:p>
             <a:pPr marL="285750" indent="-285750">
@@ -5998,15 +6081,11 @@
               <a:buChar char="•"/>
             </a:pPr>
             <a:r>
-              <a:rPr lang="en-US" b="1" dirty="0"/>
-              <a:t>Forking: </a:t>
-            </a:r>
-            <a:r>
-              <a:rPr lang="en-US" dirty="0"/>
-              <a:t>You find an interesting project on GitHub. You fork it to your account, clone your fork to your local machine, make changes, push them to your fork, and then create a pull request to suggest your changes to the original project.</a:t>
-            </a:r>
-          </a:p>
-          <a:p>
+              <a:rPr lang="en-US" dirty="0">
+                <a:hlinkClick r:id="rId4"/>
+              </a:rPr>
+              <a:t>https://www.theodinproject.com/lessons/foundations-introduction-to-git</a:t>
+            </a:r>
             <a:endParaRPr lang="en-US" dirty="0"/>
           </a:p>
           <a:p>
@@ -6015,13 +6094,19 @@
               <a:buChar char="•"/>
             </a:pPr>
             <a:r>
-              <a:rPr lang="en-US" b="1" dirty="0"/>
-              <a:t>Cloning: </a:t>
-            </a:r>
-            <a:r>
-              <a:rPr lang="en-US" dirty="0"/>
-              <a:t>You have access to a repository (either your own or one you’re a contributor to). You clone it to your local machine, work on it, and push changes directly back to the same repository.</a:t>
-            </a:r>
+              <a:rPr lang="en-US" dirty="0">
+                <a:hlinkClick r:id="rId5"/>
+              </a:rPr>
+              <a:t>https://git-scm.com/book/en/v2/</a:t>
+            </a:r>
+            <a:endParaRPr lang="en-US" dirty="0"/>
+          </a:p>
+          <a:p>
+            <a:pPr marL="285750" indent="-285750">
+              <a:buFont typeface="Arial" panose="020B0604020202020204" pitchFamily="34" charset="0"/>
+              <a:buChar char="•"/>
+            </a:pPr>
+            <a:endParaRPr lang="en-US" dirty="0"/>
           </a:p>
         </p:txBody>
       </p:sp>

</xml_diff>